<commit_message>
dist sampling ppt update
</commit_message>
<xml_diff>
--- a/lessons/Distance Sampling in unmarked.pptx
+++ b/lessons/Distance Sampling in unmarked.pptx
@@ -209,7 +209,7 @@
           <a:p>
             <a:fld id="{1CCDF753-6755-4F7B-824F-6E506049EB0D}" type="datetimeFigureOut">
               <a:rPr lang="en-US" smtClean="0"/>
-              <a:t>8/7/2020</a:t>
+              <a:t>8/6/2021</a:t>
             </a:fld>
             <a:endParaRPr lang="en-US"/>
           </a:p>
@@ -860,7 +860,7 @@
           <a:p>
             <a:fld id="{14C26DD2-B504-4FE7-9E2E-39A10996D3D9}" type="datetimeFigureOut">
               <a:rPr lang="en-US" smtClean="0"/>
-              <a:t>8/7/2020</a:t>
+              <a:t>8/6/2021</a:t>
             </a:fld>
             <a:endParaRPr lang="en-US"/>
           </a:p>
@@ -1058,7 +1058,7 @@
           <a:p>
             <a:fld id="{14C26DD2-B504-4FE7-9E2E-39A10996D3D9}" type="datetimeFigureOut">
               <a:rPr lang="en-US" smtClean="0"/>
-              <a:t>8/7/2020</a:t>
+              <a:t>8/6/2021</a:t>
             </a:fld>
             <a:endParaRPr lang="en-US"/>
           </a:p>
@@ -1266,7 +1266,7 @@
           <a:p>
             <a:fld id="{14C26DD2-B504-4FE7-9E2E-39A10996D3D9}" type="datetimeFigureOut">
               <a:rPr lang="en-US" smtClean="0"/>
-              <a:t>8/7/2020</a:t>
+              <a:t>8/6/2021</a:t>
             </a:fld>
             <a:endParaRPr lang="en-US"/>
           </a:p>
@@ -1464,7 +1464,7 @@
           <a:p>
             <a:fld id="{14C26DD2-B504-4FE7-9E2E-39A10996D3D9}" type="datetimeFigureOut">
               <a:rPr lang="en-US" smtClean="0"/>
-              <a:t>8/7/2020</a:t>
+              <a:t>8/6/2021</a:t>
             </a:fld>
             <a:endParaRPr lang="en-US"/>
           </a:p>
@@ -1739,7 +1739,7 @@
           <a:p>
             <a:fld id="{14C26DD2-B504-4FE7-9E2E-39A10996D3D9}" type="datetimeFigureOut">
               <a:rPr lang="en-US" smtClean="0"/>
-              <a:t>8/7/2020</a:t>
+              <a:t>8/6/2021</a:t>
             </a:fld>
             <a:endParaRPr lang="en-US"/>
           </a:p>
@@ -2004,7 +2004,7 @@
           <a:p>
             <a:fld id="{14C26DD2-B504-4FE7-9E2E-39A10996D3D9}" type="datetimeFigureOut">
               <a:rPr lang="en-US" smtClean="0"/>
-              <a:t>8/7/2020</a:t>
+              <a:t>8/6/2021</a:t>
             </a:fld>
             <a:endParaRPr lang="en-US"/>
           </a:p>
@@ -2416,7 +2416,7 @@
           <a:p>
             <a:fld id="{14C26DD2-B504-4FE7-9E2E-39A10996D3D9}" type="datetimeFigureOut">
               <a:rPr lang="en-US" smtClean="0"/>
-              <a:t>8/7/2020</a:t>
+              <a:t>8/6/2021</a:t>
             </a:fld>
             <a:endParaRPr lang="en-US"/>
           </a:p>
@@ -2557,7 +2557,7 @@
           <a:p>
             <a:fld id="{14C26DD2-B504-4FE7-9E2E-39A10996D3D9}" type="datetimeFigureOut">
               <a:rPr lang="en-US" smtClean="0"/>
-              <a:t>8/7/2020</a:t>
+              <a:t>8/6/2021</a:t>
             </a:fld>
             <a:endParaRPr lang="en-US"/>
           </a:p>
@@ -2670,7 +2670,7 @@
           <a:p>
             <a:fld id="{14C26DD2-B504-4FE7-9E2E-39A10996D3D9}" type="datetimeFigureOut">
               <a:rPr lang="en-US" smtClean="0"/>
-              <a:t>8/7/2020</a:t>
+              <a:t>8/6/2021</a:t>
             </a:fld>
             <a:endParaRPr lang="en-US"/>
           </a:p>
@@ -2981,7 +2981,7 @@
           <a:p>
             <a:fld id="{14C26DD2-B504-4FE7-9E2E-39A10996D3D9}" type="datetimeFigureOut">
               <a:rPr lang="en-US" smtClean="0"/>
-              <a:t>8/7/2020</a:t>
+              <a:t>8/6/2021</a:t>
             </a:fld>
             <a:endParaRPr lang="en-US"/>
           </a:p>
@@ -3269,7 +3269,7 @@
           <a:p>
             <a:fld id="{14C26DD2-B504-4FE7-9E2E-39A10996D3D9}" type="datetimeFigureOut">
               <a:rPr lang="en-US" smtClean="0"/>
-              <a:t>8/7/2020</a:t>
+              <a:t>8/6/2021</a:t>
             </a:fld>
             <a:endParaRPr lang="en-US"/>
           </a:p>
@@ -3510,7 +3510,7 @@
           <a:p>
             <a:fld id="{14C26DD2-B504-4FE7-9E2E-39A10996D3D9}" type="datetimeFigureOut">
               <a:rPr lang="en-US" smtClean="0"/>
-              <a:t>8/7/2020</a:t>
+              <a:t>8/6/2021</a:t>
             </a:fld>
             <a:endParaRPr lang="en-US"/>
           </a:p>
@@ -3984,7 +3984,7 @@
           <a:p>
             <a:r>
               <a:rPr lang="en-US" dirty="0"/>
-              <a:t>8/10/2020</a:t>
+              <a:t>8/6/2021</a:t>
             </a:r>
           </a:p>
         </p:txBody>
@@ -4591,8 +4591,8 @@
           </a:p>
         </p:txBody>
       </p:sp>
-      <mc:AlternateContent xmlns:mc="http://schemas.openxmlformats.org/markup-compatibility/2006">
-        <mc:Choice xmlns:a14="http://schemas.microsoft.com/office/drawing/2010/main" Requires="a14">
+      <mc:AlternateContent xmlns:mc="http://schemas.openxmlformats.org/markup-compatibility/2006" xmlns:a14="http://schemas.microsoft.com/office/drawing/2010/main">
+        <mc:Choice Requires="a14">
           <p:sp>
             <p:nvSpPr>
               <p:cNvPr id="4" name="Rectangle 3">
@@ -4658,13 +4658,7 @@
                             <a:rPr lang="en-US" sz="2800" b="0" i="1" smtClean="0">
                               <a:latin typeface="Cambria Math" panose="02040503050406030204" pitchFamily="18" charset="0"/>
                             </a:rPr>
-                            <m:t>)</m:t>
-                          </m:r>
-                          <m:r>
-                            <a:rPr lang="en-US" sz="2800" b="0" i="1" smtClean="0">
-                              <a:latin typeface="Cambria Math" panose="02040503050406030204" pitchFamily="18" charset="0"/>
-                            </a:rPr>
-                            <m:t> </m:t>
+                            <m:t>) </m:t>
                           </m:r>
                         </m:fName>
                         <m:e>
@@ -4862,7 +4856,7 @@
             </p:txBody>
           </p:sp>
         </mc:Choice>
-        <mc:Fallback>
+        <mc:Fallback xmlns="">
           <p:sp>
             <p:nvSpPr>
               <p:cNvPr id="4" name="Rectangle 3">
@@ -5965,8 +5959,8 @@
           </p:sp>
         </mc:Fallback>
       </mc:AlternateContent>
-      <mc:AlternateContent xmlns:mc="http://schemas.openxmlformats.org/markup-compatibility/2006">
-        <mc:Choice xmlns:a14="http://schemas.microsoft.com/office/drawing/2010/main" Requires="a14">
+      <mc:AlternateContent xmlns:mc="http://schemas.openxmlformats.org/markup-compatibility/2006" xmlns:a14="http://schemas.microsoft.com/office/drawing/2010/main">
+        <mc:Choice Requires="a14">
           <p:sp>
             <p:nvSpPr>
               <p:cNvPr id="5" name="TextBox 4">
@@ -6117,7 +6111,7 @@
             </p:txBody>
           </p:sp>
         </mc:Choice>
-        <mc:Fallback>
+        <mc:Fallback xmlns="">
           <p:sp>
             <p:nvSpPr>
               <p:cNvPr id="5" name="TextBox 4">
@@ -6162,8 +6156,8 @@
           </p:sp>
         </mc:Fallback>
       </mc:AlternateContent>
-      <mc:AlternateContent xmlns:mc="http://schemas.openxmlformats.org/markup-compatibility/2006">
-        <mc:Choice xmlns:a14="http://schemas.microsoft.com/office/drawing/2010/main" Requires="a14">
+      <mc:AlternateContent xmlns:mc="http://schemas.openxmlformats.org/markup-compatibility/2006" xmlns:a14="http://schemas.microsoft.com/office/drawing/2010/main">
+        <mc:Choice Requires="a14">
           <p:sp>
             <p:nvSpPr>
               <p:cNvPr id="7" name="TextBox 6">
@@ -6192,7 +6186,6 @@
               </a:bodyPr>
               <a:lstStyle/>
               <a:p>
-                <a:pPr/>
                 <a14:m>
                   <m:oMath xmlns:m="http://schemas.openxmlformats.org/officeDocument/2006/math">
                     <m:func>
@@ -6373,7 +6366,7 @@
             </p:txBody>
           </p:sp>
         </mc:Choice>
-        <mc:Fallback>
+        <mc:Fallback xmlns="">
           <p:sp>
             <p:nvSpPr>
               <p:cNvPr id="7" name="TextBox 6">
@@ -6418,8 +6411,8 @@
           </p:sp>
         </mc:Fallback>
       </mc:AlternateContent>
-      <mc:AlternateContent xmlns:mc="http://schemas.openxmlformats.org/markup-compatibility/2006">
-        <mc:Choice xmlns:a14="http://schemas.microsoft.com/office/drawing/2010/main" Requires="a14">
+      <mc:AlternateContent xmlns:mc="http://schemas.openxmlformats.org/markup-compatibility/2006" xmlns:a14="http://schemas.microsoft.com/office/drawing/2010/main">
+        <mc:Choice Requires="a14">
           <p:sp>
             <p:nvSpPr>
               <p:cNvPr id="8" name="TextBox 7">
@@ -6508,7 +6501,7 @@
             </p:txBody>
           </p:sp>
         </mc:Choice>
-        <mc:Fallback>
+        <mc:Fallback xmlns="">
           <p:sp>
             <p:nvSpPr>
               <p:cNvPr id="8" name="TextBox 7">
@@ -8928,8 +8921,8 @@
           </p:sp>
         </mc:Fallback>
       </mc:AlternateContent>
-      <mc:AlternateContent xmlns:mc="http://schemas.openxmlformats.org/markup-compatibility/2006">
-        <mc:Choice xmlns:a14="http://schemas.microsoft.com/office/drawing/2010/main" Requires="a14">
+      <mc:AlternateContent xmlns:mc="http://schemas.openxmlformats.org/markup-compatibility/2006" xmlns:a14="http://schemas.microsoft.com/office/drawing/2010/main">
+        <mc:Choice Requires="a14">
           <p:sp>
             <p:nvSpPr>
               <p:cNvPr id="18" name="Rectangle 17">
@@ -9125,7 +9118,7 @@
             </p:txBody>
           </p:sp>
         </mc:Choice>
-        <mc:Fallback>
+        <mc:Fallback xmlns="">
           <p:sp>
             <p:nvSpPr>
               <p:cNvPr id="18" name="Rectangle 17">

</xml_diff>